<commit_message>
flat field update of graph
</commit_message>
<xml_diff>
--- a/figures/resources/illumination_artefact.pptx
+++ b/figures/resources/illumination_artefact.pptx
@@ -7,6 +7,8 @@
   <p:sldIdLst>
     <p:sldId id="256" r:id="rId2"/>
     <p:sldId id="257" r:id="rId3"/>
+    <p:sldId id="258" r:id="rId4"/>
+    <p:sldId id="259" r:id="rId5"/>
   </p:sldIdLst>
   <p:sldSz cx="12192000" cy="6858000"/>
   <p:notesSz cx="6858000" cy="9144000"/>
@@ -3698,6 +3700,415 @@
     <p:extLst>
       <p:ext uri="{BB962C8B-B14F-4D97-AF65-F5344CB8AC3E}">
         <p14:creationId xmlns:p14="http://schemas.microsoft.com/office/powerpoint/2010/main" val="4092172277"/>
+      </p:ext>
+    </p:extLst>
+  </p:cSld>
+  <p:clrMapOvr>
+    <a:masterClrMapping/>
+  </p:clrMapOvr>
+</p:sld>
+</file>
+
+<file path=ppt/slides/slide3.xml><?xml version="1.0" encoding="utf-8"?>
+<p:sld xmlns:a="http://schemas.openxmlformats.org/drawingml/2006/main" xmlns:r="http://schemas.openxmlformats.org/officeDocument/2006/relationships" xmlns:p="http://schemas.openxmlformats.org/presentationml/2006/main">
+  <p:cSld>
+    <p:spTree>
+      <p:nvGrpSpPr>
+        <p:cNvPr id="1" name=""/>
+        <p:cNvGrpSpPr/>
+        <p:nvPr/>
+      </p:nvGrpSpPr>
+      <p:grpSpPr>
+        <a:xfrm>
+          <a:off x="0" y="0"/>
+          <a:ext cx="0" cy="0"/>
+          <a:chOff x="0" y="0"/>
+          <a:chExt cx="0" cy="0"/>
+        </a:xfrm>
+      </p:grpSpPr>
+      <p:pic>
+        <p:nvPicPr>
+          <p:cNvPr id="3" name="Picture 2">
+            <a:extLst>
+              <a:ext uri="{FF2B5EF4-FFF2-40B4-BE49-F238E27FC236}">
+                <a16:creationId xmlns:a16="http://schemas.microsoft.com/office/drawing/2014/main" id="{CECD851D-8E08-9313-2330-3E4DB63398AE}"/>
+              </a:ext>
+            </a:extLst>
+          </p:cNvPr>
+          <p:cNvPicPr>
+            <a:picLocks noChangeAspect="1"/>
+          </p:cNvPicPr>
+          <p:nvPr/>
+        </p:nvPicPr>
+        <p:blipFill>
+          <a:blip r:embed="rId2"/>
+          <a:stretch>
+            <a:fillRect/>
+          </a:stretch>
+        </p:blipFill>
+        <p:spPr>
+          <a:xfrm>
+            <a:off x="1245019" y="383748"/>
+            <a:ext cx="3390900" cy="2679700"/>
+          </a:xfrm>
+          <a:prstGeom prst="rect">
+            <a:avLst/>
+          </a:prstGeom>
+        </p:spPr>
+      </p:pic>
+      <p:sp>
+        <p:nvSpPr>
+          <p:cNvPr id="5" name="TextBox 4">
+            <a:extLst>
+              <a:ext uri="{FF2B5EF4-FFF2-40B4-BE49-F238E27FC236}">
+                <a16:creationId xmlns:a16="http://schemas.microsoft.com/office/drawing/2014/main" id="{59627DB8-E093-EA05-DA05-EFA1FF16CD2C}"/>
+              </a:ext>
+            </a:extLst>
+          </p:cNvPr>
+          <p:cNvSpPr txBox="1"/>
+          <p:nvPr/>
+        </p:nvSpPr>
+        <p:spPr>
+          <a:xfrm>
+            <a:off x="426513" y="6306441"/>
+            <a:ext cx="5174216" cy="461665"/>
+          </a:xfrm>
+          <a:prstGeom prst="rect">
+            <a:avLst/>
+          </a:prstGeom>
+          <a:noFill/>
+        </p:spPr>
+        <p:txBody>
+          <a:bodyPr wrap="square" rtlCol="0">
+            <a:spAutoFit/>
+          </a:bodyPr>
+          <a:lstStyle/>
+          <a:p>
+            <a:pPr algn="ctr"/>
+            <a:r>
+              <a:rPr lang="en-DE" sz="2400" dirty="0">
+                <a:latin typeface="Calibri" panose="020F0502020204030204" pitchFamily="34" charset="0"/>
+                <a:cs typeface="Calibri" panose="020F0502020204030204" pitchFamily="34" charset="0"/>
+              </a:rPr>
+              <a:t>Normalized flat-field</a:t>
+            </a:r>
+          </a:p>
+        </p:txBody>
+      </p:sp>
+      <p:sp>
+        <p:nvSpPr>
+          <p:cNvPr id="7" name="TextBox 6">
+            <a:extLst>
+              <a:ext uri="{FF2B5EF4-FFF2-40B4-BE49-F238E27FC236}">
+                <a16:creationId xmlns:a16="http://schemas.microsoft.com/office/drawing/2014/main" id="{EB90CA2B-3F9A-9973-D990-CA94D4ABC2DB}"/>
+              </a:ext>
+            </a:extLst>
+          </p:cNvPr>
+          <p:cNvSpPr txBox="1"/>
+          <p:nvPr/>
+        </p:nvSpPr>
+        <p:spPr>
+          <a:xfrm>
+            <a:off x="582984" y="89894"/>
+            <a:ext cx="4714970" cy="461665"/>
+          </a:xfrm>
+          <a:prstGeom prst="rect">
+            <a:avLst/>
+          </a:prstGeom>
+          <a:noFill/>
+        </p:spPr>
+        <p:txBody>
+          <a:bodyPr wrap="square" rtlCol="0">
+            <a:spAutoFit/>
+          </a:bodyPr>
+          <a:lstStyle/>
+          <a:p>
+            <a:pPr algn="ctr"/>
+            <a:r>
+              <a:rPr lang="en-DE" sz="2400" dirty="0">
+                <a:latin typeface="Calibri" panose="020F0502020204030204" pitchFamily="34" charset="0"/>
+                <a:cs typeface="Calibri" panose="020F0502020204030204" pitchFamily="34" charset="0"/>
+              </a:rPr>
+              <a:t>Background subtracted image</a:t>
+            </a:r>
+          </a:p>
+        </p:txBody>
+      </p:sp>
+      <p:pic>
+        <p:nvPicPr>
+          <p:cNvPr id="11" name="Picture 10">
+            <a:extLst>
+              <a:ext uri="{FF2B5EF4-FFF2-40B4-BE49-F238E27FC236}">
+                <a16:creationId xmlns:a16="http://schemas.microsoft.com/office/drawing/2014/main" id="{8AECD4A3-ECED-7ACF-543E-EBD9A23A918C}"/>
+              </a:ext>
+            </a:extLst>
+          </p:cNvPr>
+          <p:cNvPicPr>
+            <a:picLocks noChangeAspect="1"/>
+          </p:cNvPicPr>
+          <p:nvPr/>
+        </p:nvPicPr>
+        <p:blipFill>
+          <a:blip r:embed="rId3"/>
+          <a:stretch>
+            <a:fillRect/>
+          </a:stretch>
+        </p:blipFill>
+        <p:spPr>
+          <a:xfrm>
+            <a:off x="1429931" y="3843120"/>
+            <a:ext cx="3187700" cy="2400300"/>
+          </a:xfrm>
+          <a:prstGeom prst="rect">
+            <a:avLst/>
+          </a:prstGeom>
+        </p:spPr>
+      </p:pic>
+      <p:pic>
+        <p:nvPicPr>
+          <p:cNvPr id="13" name="Picture 12">
+            <a:extLst>
+              <a:ext uri="{FF2B5EF4-FFF2-40B4-BE49-F238E27FC236}">
+                <a16:creationId xmlns:a16="http://schemas.microsoft.com/office/drawing/2014/main" id="{B66218B4-ECD0-BAF6-5604-412A95AFE998}"/>
+              </a:ext>
+            </a:extLst>
+          </p:cNvPr>
+          <p:cNvPicPr>
+            <a:picLocks noChangeAspect="1"/>
+          </p:cNvPicPr>
+          <p:nvPr/>
+        </p:nvPicPr>
+        <p:blipFill>
+          <a:blip r:embed="rId4"/>
+          <a:stretch>
+            <a:fillRect/>
+          </a:stretch>
+        </p:blipFill>
+        <p:spPr>
+          <a:xfrm>
+            <a:off x="7556083" y="2006854"/>
+            <a:ext cx="3390900" cy="2679700"/>
+          </a:xfrm>
+          <a:prstGeom prst="rect">
+            <a:avLst/>
+          </a:prstGeom>
+        </p:spPr>
+      </p:pic>
+      <mc:AlternateContent xmlns:mc="http://schemas.openxmlformats.org/markup-compatibility/2006">
+        <mc:Choice xmlns:a14="http://schemas.microsoft.com/office/drawing/2010/main" Requires="a14">
+          <p:sp>
+            <p:nvSpPr>
+              <p:cNvPr id="14" name="TextBox 13">
+                <a:extLst>
+                  <a:ext uri="{FF2B5EF4-FFF2-40B4-BE49-F238E27FC236}">
+                    <a16:creationId xmlns:a16="http://schemas.microsoft.com/office/drawing/2014/main" id="{5C3FC77E-4868-2A72-C020-3818444C4966}"/>
+                  </a:ext>
+                </a:extLst>
+              </p:cNvPr>
+              <p:cNvSpPr txBox="1"/>
+              <p:nvPr/>
+            </p:nvSpPr>
+            <p:spPr>
+              <a:xfrm>
+                <a:off x="2310549" y="3071605"/>
+                <a:ext cx="1463040" cy="707886"/>
+              </a:xfrm>
+              <a:prstGeom prst="rect">
+                <a:avLst/>
+              </a:prstGeom>
+              <a:noFill/>
+            </p:spPr>
+            <p:txBody>
+              <a:bodyPr wrap="square" rtlCol="0">
+                <a:spAutoFit/>
+              </a:bodyPr>
+              <a:lstStyle/>
+              <a:p>
+                <a14:m>
+                  <m:oMathPara xmlns:m="http://schemas.openxmlformats.org/officeDocument/2006/math">
+                    <m:oMathParaPr>
+                      <m:jc m:val="centerGroup"/>
+                    </m:oMathParaPr>
+                    <m:oMath xmlns:m="http://schemas.openxmlformats.org/officeDocument/2006/math">
+                      <m:r>
+                        <a:rPr lang="en-DE" sz="4000" b="1" i="1" smtClean="0">
+                          <a:latin typeface="Cambria Math" panose="02040503050406030204" pitchFamily="18" charset="0"/>
+                          <a:ea typeface="Cambria Math" panose="02040503050406030204" pitchFamily="18" charset="0"/>
+                        </a:rPr>
+                        <m:t>÷</m:t>
+                      </m:r>
+                    </m:oMath>
+                  </m:oMathPara>
+                </a14:m>
+                <a:endParaRPr lang="en-DE" sz="4000" b="1" dirty="0"/>
+              </a:p>
+            </p:txBody>
+          </p:sp>
+        </mc:Choice>
+        <mc:Fallback>
+          <p:sp>
+            <p:nvSpPr>
+              <p:cNvPr id="14" name="TextBox 13">
+                <a:extLst>
+                  <a:ext uri="{FF2B5EF4-FFF2-40B4-BE49-F238E27FC236}">
+                    <a16:creationId xmlns:a16="http://schemas.microsoft.com/office/drawing/2014/main" id="{5C3FC77E-4868-2A72-C020-3818444C4966}"/>
+                  </a:ext>
+                </a:extLst>
+              </p:cNvPr>
+              <p:cNvSpPr txBox="1">
+                <a:spLocks noRot="1" noChangeAspect="1" noMove="1" noResize="1" noEditPoints="1" noAdjustHandles="1" noChangeArrowheads="1" noChangeShapeType="1" noTextEdit="1"/>
+              </p:cNvSpPr>
+              <p:nvPr/>
+            </p:nvSpPr>
+            <p:spPr>
+              <a:xfrm>
+                <a:off x="2310549" y="3071605"/>
+                <a:ext cx="1463040" cy="707886"/>
+              </a:xfrm>
+              <a:prstGeom prst="rect">
+                <a:avLst/>
+              </a:prstGeom>
+              <a:blipFill>
+                <a:blip r:embed="rId5"/>
+                <a:stretch>
+                  <a:fillRect/>
+                </a:stretch>
+              </a:blipFill>
+            </p:spPr>
+            <p:txBody>
+              <a:bodyPr/>
+              <a:lstStyle/>
+              <a:p>
+                <a:r>
+                  <a:rPr lang="en-DE">
+                    <a:noFill/>
+                  </a:rPr>
+                  <a:t> </a:t>
+                </a:r>
+              </a:p>
+            </p:txBody>
+          </p:sp>
+        </mc:Fallback>
+      </mc:AlternateContent>
+      <p:sp>
+        <p:nvSpPr>
+          <p:cNvPr id="15" name="Right Arrow 14">
+            <a:extLst>
+              <a:ext uri="{FF2B5EF4-FFF2-40B4-BE49-F238E27FC236}">
+                <a16:creationId xmlns:a16="http://schemas.microsoft.com/office/drawing/2014/main" id="{CDCBBB11-CDEF-A4C2-6108-B864D44C1A06}"/>
+              </a:ext>
+            </a:extLst>
+          </p:cNvPr>
+          <p:cNvSpPr/>
+          <p:nvPr/>
+        </p:nvSpPr>
+        <p:spPr>
+          <a:xfrm>
+            <a:off x="4919473" y="2779776"/>
+            <a:ext cx="2487168" cy="1353312"/>
+          </a:xfrm>
+          <a:prstGeom prst="rightArrow">
+            <a:avLst/>
+          </a:prstGeom>
+        </p:spPr>
+        <p:style>
+          <a:lnRef idx="2">
+            <a:schemeClr val="accent1">
+              <a:shade val="15000"/>
+            </a:schemeClr>
+          </a:lnRef>
+          <a:fillRef idx="1">
+            <a:schemeClr val="accent1"/>
+          </a:fillRef>
+          <a:effectRef idx="0">
+            <a:schemeClr val="accent1"/>
+          </a:effectRef>
+          <a:fontRef idx="minor">
+            <a:schemeClr val="lt1"/>
+          </a:fontRef>
+        </p:style>
+        <p:txBody>
+          <a:bodyPr rtlCol="0" anchor="ctr"/>
+          <a:lstStyle/>
+          <a:p>
+            <a:pPr algn="ctr"/>
+            <a:endParaRPr lang="en-DE"/>
+          </a:p>
+        </p:txBody>
+      </p:sp>
+      <p:sp>
+        <p:nvSpPr>
+          <p:cNvPr id="16" name="TextBox 15">
+            <a:extLst>
+              <a:ext uri="{FF2B5EF4-FFF2-40B4-BE49-F238E27FC236}">
+                <a16:creationId xmlns:a16="http://schemas.microsoft.com/office/drawing/2014/main" id="{85B594CB-0B8D-1F64-5C06-FFF793A3BB18}"/>
+              </a:ext>
+            </a:extLst>
+          </p:cNvPr>
+          <p:cNvSpPr txBox="1"/>
+          <p:nvPr/>
+        </p:nvSpPr>
+        <p:spPr>
+          <a:xfrm>
+            <a:off x="6664425" y="1660606"/>
+            <a:ext cx="5174216" cy="461665"/>
+          </a:xfrm>
+          <a:prstGeom prst="rect">
+            <a:avLst/>
+          </a:prstGeom>
+          <a:noFill/>
+        </p:spPr>
+        <p:txBody>
+          <a:bodyPr wrap="square" rtlCol="0">
+            <a:spAutoFit/>
+          </a:bodyPr>
+          <a:lstStyle/>
+          <a:p>
+            <a:pPr algn="ctr"/>
+            <a:r>
+              <a:rPr lang="en-DE" sz="2400" dirty="0">
+                <a:latin typeface="Calibri" panose="020F0502020204030204" pitchFamily="34" charset="0"/>
+                <a:cs typeface="Calibri" panose="020F0502020204030204" pitchFamily="34" charset="0"/>
+              </a:rPr>
+              <a:t>Flat field corrected image</a:t>
+            </a:r>
+          </a:p>
+        </p:txBody>
+      </p:sp>
+    </p:spTree>
+    <p:extLst>
+      <p:ext uri="{BB962C8B-B14F-4D97-AF65-F5344CB8AC3E}">
+        <p14:creationId xmlns:p14="http://schemas.microsoft.com/office/powerpoint/2010/main" val="431842079"/>
+      </p:ext>
+    </p:extLst>
+  </p:cSld>
+  <p:clrMapOvr>
+    <a:masterClrMapping/>
+  </p:clrMapOvr>
+</p:sld>
+</file>
+
+<file path=ppt/slides/slide4.xml><?xml version="1.0" encoding="utf-8"?>
+<p:sld xmlns:a="http://schemas.openxmlformats.org/drawingml/2006/main" xmlns:r="http://schemas.openxmlformats.org/officeDocument/2006/relationships" xmlns:p="http://schemas.openxmlformats.org/presentationml/2006/main">
+  <p:cSld>
+    <p:spTree>
+      <p:nvGrpSpPr>
+        <p:cNvPr id="1" name=""/>
+        <p:cNvGrpSpPr/>
+        <p:nvPr/>
+      </p:nvGrpSpPr>
+      <p:grpSpPr>
+        <a:xfrm>
+          <a:off x="0" y="0"/>
+          <a:ext cx="0" cy="0"/>
+          <a:chOff x="0" y="0"/>
+          <a:chExt cx="0" cy="0"/>
+        </a:xfrm>
+      </p:grpSpPr>
+    </p:spTree>
+    <p:extLst>
+      <p:ext uri="{BB962C8B-B14F-4D97-AF65-F5344CB8AC3E}">
+        <p14:creationId xmlns:p14="http://schemas.microsoft.com/office/powerpoint/2010/main" val="3815495552"/>
       </p:ext>
     </p:extLst>
   </p:cSld>

</xml_diff>